<commit_message>
Updated slides with updated wireframes
</commit_message>
<xml_diff>
--- a/Design_Doc_MyStudies.pptx
+++ b/Design_Doc_MyStudies.pptx
@@ -10,15 +10,16 @@
     <p:sldId id="258" r:id="rId4"/>
     <p:sldId id="267" r:id="rId5"/>
     <p:sldId id="259" r:id="rId6"/>
-    <p:sldId id="263" r:id="rId7"/>
-    <p:sldId id="264" r:id="rId8"/>
-    <p:sldId id="268" r:id="rId9"/>
-    <p:sldId id="269" r:id="rId10"/>
-    <p:sldId id="260" r:id="rId11"/>
-    <p:sldId id="261" r:id="rId12"/>
-    <p:sldId id="262" r:id="rId13"/>
-    <p:sldId id="265" r:id="rId14"/>
-    <p:sldId id="266" r:id="rId15"/>
+    <p:sldId id="270" r:id="rId7"/>
+    <p:sldId id="263" r:id="rId8"/>
+    <p:sldId id="264" r:id="rId9"/>
+    <p:sldId id="268" r:id="rId10"/>
+    <p:sldId id="269" r:id="rId11"/>
+    <p:sldId id="260" r:id="rId12"/>
+    <p:sldId id="261" r:id="rId13"/>
+    <p:sldId id="262" r:id="rId14"/>
+    <p:sldId id="265" r:id="rId15"/>
+    <p:sldId id="266" r:id="rId16"/>
   </p:sldIdLst>
   <p:sldSz cx="12192000" cy="6858000"/>
   <p:notesSz cx="6858000" cy="9144000"/>
@@ -272,7 +273,7 @@
           <a:p>
             <a:fld id="{48A87A34-81AB-432B-8DAE-1953F412C126}" type="datetimeFigureOut">
               <a:rPr lang="en-US" smtClean="0"/>
-              <a:t>2/22/25</a:t>
+              <a:t>3/18/25</a:t>
             </a:fld>
             <a:endParaRPr lang="en-US" dirty="0"/>
           </a:p>
@@ -470,7 +471,7 @@
           <a:p>
             <a:fld id="{48A87A34-81AB-432B-8DAE-1953F412C126}" type="datetimeFigureOut">
               <a:rPr lang="en-US" smtClean="0"/>
-              <a:t>2/22/25</a:t>
+              <a:t>3/18/25</a:t>
             </a:fld>
             <a:endParaRPr lang="en-US" dirty="0"/>
           </a:p>
@@ -678,7 +679,7 @@
           <a:p>
             <a:fld id="{48A87A34-81AB-432B-8DAE-1953F412C126}" type="datetimeFigureOut">
               <a:rPr lang="en-US" smtClean="0"/>
-              <a:t>2/22/25</a:t>
+              <a:t>3/18/25</a:t>
             </a:fld>
             <a:endParaRPr lang="en-US" dirty="0"/>
           </a:p>
@@ -876,7 +877,7 @@
           <a:p>
             <a:fld id="{48A87A34-81AB-432B-8DAE-1953F412C126}" type="datetimeFigureOut">
               <a:rPr lang="en-US" smtClean="0"/>
-              <a:t>2/22/25</a:t>
+              <a:t>3/18/25</a:t>
             </a:fld>
             <a:endParaRPr lang="en-US" dirty="0"/>
           </a:p>
@@ -1151,7 +1152,7 @@
           <a:p>
             <a:fld id="{48A87A34-81AB-432B-8DAE-1953F412C126}" type="datetimeFigureOut">
               <a:rPr lang="en-US" smtClean="0"/>
-              <a:t>2/22/25</a:t>
+              <a:t>3/18/25</a:t>
             </a:fld>
             <a:endParaRPr lang="en-US" dirty="0"/>
           </a:p>
@@ -1416,7 +1417,7 @@
           <a:p>
             <a:fld id="{48A87A34-81AB-432B-8DAE-1953F412C126}" type="datetimeFigureOut">
               <a:rPr lang="en-US" smtClean="0"/>
-              <a:t>2/22/25</a:t>
+              <a:t>3/18/25</a:t>
             </a:fld>
             <a:endParaRPr lang="en-US" dirty="0"/>
           </a:p>
@@ -1829,7 +1830,7 @@
             <a:fld id="{48A87A34-81AB-432B-8DAE-1953F412C126}" type="datetimeFigureOut">
               <a:rPr lang="en-US" smtClean="0"/>
               <a:pPr/>
-              <a:t>2/22/25</a:t>
+              <a:t>3/18/25</a:t>
             </a:fld>
             <a:endParaRPr lang="en-US" dirty="0"/>
           </a:p>
@@ -1971,7 +1972,7 @@
           <a:p>
             <a:fld id="{48A87A34-81AB-432B-8DAE-1953F412C126}" type="datetimeFigureOut">
               <a:rPr lang="en-US" smtClean="0"/>
-              <a:t>2/22/25</a:t>
+              <a:t>3/18/25</a:t>
             </a:fld>
             <a:endParaRPr lang="en-US" dirty="0"/>
           </a:p>
@@ -2084,7 +2085,7 @@
           <a:p>
             <a:fld id="{48A87A34-81AB-432B-8DAE-1953F412C126}" type="datetimeFigureOut">
               <a:rPr lang="en-US" smtClean="0"/>
-              <a:t>2/22/25</a:t>
+              <a:t>3/18/25</a:t>
             </a:fld>
             <a:endParaRPr lang="en-US" dirty="0"/>
           </a:p>
@@ -2395,7 +2396,7 @@
           <a:p>
             <a:fld id="{48A87A34-81AB-432B-8DAE-1953F412C126}" type="datetimeFigureOut">
               <a:rPr lang="en-US" smtClean="0"/>
-              <a:t>2/22/25</a:t>
+              <a:t>3/18/25</a:t>
             </a:fld>
             <a:endParaRPr lang="en-US" dirty="0"/>
           </a:p>
@@ -2684,7 +2685,7 @@
             <a:fld id="{48A87A34-81AB-432B-8DAE-1953F412C126}" type="datetimeFigureOut">
               <a:rPr lang="en-US" smtClean="0"/>
               <a:pPr/>
-              <a:t>2/22/25</a:t>
+              <a:t>3/18/25</a:t>
             </a:fld>
             <a:endParaRPr lang="en-US" dirty="0"/>
           </a:p>
@@ -2926,7 +2927,7 @@
             <a:fld id="{48A87A34-81AB-432B-8DAE-1953F412C126}" type="datetimeFigureOut">
               <a:rPr lang="en-US" smtClean="0"/>
               <a:pPr/>
-              <a:t>2/22/25</a:t>
+              <a:t>3/18/25</a:t>
             </a:fld>
             <a:endParaRPr lang="en-US" dirty="0"/>
           </a:p>
@@ -3439,6 +3440,93 @@
 </file>
 
 <file path=ppt/slides/slide10.xml><?xml version="1.0" encoding="utf-8"?>
+<p:sld xmlns:a="http://schemas.openxmlformats.org/drawingml/2006/main" xmlns:r="http://schemas.openxmlformats.org/officeDocument/2006/relationships" xmlns:p="http://schemas.openxmlformats.org/presentationml/2006/main">
+  <p:cSld>
+    <p:spTree>
+      <p:nvGrpSpPr>
+        <p:cNvPr id="1" name=""/>
+        <p:cNvGrpSpPr/>
+        <p:nvPr/>
+      </p:nvGrpSpPr>
+      <p:grpSpPr>
+        <a:xfrm>
+          <a:off x="0" y="0"/>
+          <a:ext cx="0" cy="0"/>
+          <a:chOff x="0" y="0"/>
+          <a:chExt cx="0" cy="0"/>
+        </a:xfrm>
+      </p:grpSpPr>
+      <p:sp>
+        <p:nvSpPr>
+          <p:cNvPr id="2" name="Title 1">
+            <a:extLst>
+              <a:ext uri="{FF2B5EF4-FFF2-40B4-BE49-F238E27FC236}">
+                <a16:creationId xmlns:a16="http://schemas.microsoft.com/office/drawing/2014/main" id="{34D8EF66-90EC-EE39-14CD-0D2110742D63}"/>
+              </a:ext>
+            </a:extLst>
+          </p:cNvPr>
+          <p:cNvSpPr>
+            <a:spLocks noGrp="1"/>
+          </p:cNvSpPr>
+          <p:nvPr>
+            <p:ph type="title"/>
+          </p:nvPr>
+        </p:nvSpPr>
+        <p:spPr/>
+        <p:txBody>
+          <a:bodyPr/>
+          <a:lstStyle/>
+          <a:p>
+            <a:r>
+              <a:rPr lang="en-US" dirty="0"/>
+              <a:t>About us Wireframe</a:t>
+            </a:r>
+          </a:p>
+        </p:txBody>
+      </p:sp>
+      <p:pic>
+        <p:nvPicPr>
+          <p:cNvPr id="5" name="Content Placeholder 4" descr="A screenshot of a computer&#10;&#10;AI-generated content may be incorrect.">
+            <a:extLst>
+              <a:ext uri="{FF2B5EF4-FFF2-40B4-BE49-F238E27FC236}">
+                <a16:creationId xmlns:a16="http://schemas.microsoft.com/office/drawing/2014/main" id="{16677C13-CA96-2340-AB69-E6811B6489AF}"/>
+              </a:ext>
+            </a:extLst>
+          </p:cNvPr>
+          <p:cNvPicPr>
+            <a:picLocks noGrp="1" noChangeAspect="1"/>
+          </p:cNvPicPr>
+          <p:nvPr>
+            <p:ph idx="1"/>
+          </p:nvPr>
+        </p:nvPicPr>
+        <p:blipFill>
+          <a:blip r:embed="rId2"/>
+          <a:stretch>
+            <a:fillRect/>
+          </a:stretch>
+        </p:blipFill>
+        <p:spPr>
+          <a:xfrm>
+            <a:off x="2340879" y="1825625"/>
+            <a:ext cx="7510242" cy="4351338"/>
+          </a:xfrm>
+        </p:spPr>
+      </p:pic>
+    </p:spTree>
+    <p:extLst>
+      <p:ext uri="{BB962C8B-B14F-4D97-AF65-F5344CB8AC3E}">
+        <p14:creationId xmlns:p14="http://schemas.microsoft.com/office/powerpoint/2010/main" val="3613504849"/>
+      </p:ext>
+    </p:extLst>
+  </p:cSld>
+  <p:clrMapOvr>
+    <a:masterClrMapping/>
+  </p:clrMapOvr>
+</p:sld>
+</file>
+
+<file path=ppt/slides/slide11.xml><?xml version="1.0" encoding="utf-8"?>
 <p:sld xmlns:a="http://schemas.openxmlformats.org/drawingml/2006/main" xmlns:r="http://schemas.openxmlformats.org/officeDocument/2006/relationships" xmlns:p="http://schemas.openxmlformats.org/presentationml/2006/main">
   <p:cSld>
     <p:spTree>
@@ -3859,98 +3947,6 @@
 </p:sld>
 </file>
 
-<file path=ppt/slides/slide11.xml><?xml version="1.0" encoding="utf-8"?>
-<p:sld xmlns:a="http://schemas.openxmlformats.org/drawingml/2006/main" xmlns:r="http://schemas.openxmlformats.org/officeDocument/2006/relationships" xmlns:p="http://schemas.openxmlformats.org/presentationml/2006/main">
-  <p:cSld>
-    <p:spTree>
-      <p:nvGrpSpPr>
-        <p:cNvPr id="1" name=""/>
-        <p:cNvGrpSpPr/>
-        <p:nvPr/>
-      </p:nvGrpSpPr>
-      <p:grpSpPr>
-        <a:xfrm>
-          <a:off x="0" y="0"/>
-          <a:ext cx="0" cy="0"/>
-          <a:chOff x="0" y="0"/>
-          <a:chExt cx="0" cy="0"/>
-        </a:xfrm>
-      </p:grpSpPr>
-      <p:sp>
-        <p:nvSpPr>
-          <p:cNvPr id="2" name="Title 1">
-            <a:extLst>
-              <a:ext uri="{FF2B5EF4-FFF2-40B4-BE49-F238E27FC236}">
-                <a16:creationId xmlns:a16="http://schemas.microsoft.com/office/drawing/2014/main" id="{5B25892B-2D2F-A0FE-A7CD-632FCDFC1580}"/>
-              </a:ext>
-            </a:extLst>
-          </p:cNvPr>
-          <p:cNvSpPr>
-            <a:spLocks noGrp="1"/>
-          </p:cNvSpPr>
-          <p:nvPr>
-            <p:ph type="title"/>
-          </p:nvPr>
-        </p:nvSpPr>
-        <p:spPr/>
-        <p:txBody>
-          <a:bodyPr/>
-          <a:lstStyle/>
-          <a:p>
-            <a:r>
-              <a:rPr lang="en-US" dirty="0"/>
-              <a:t>Will I use any Datasets?</a:t>
-            </a:r>
-          </a:p>
-        </p:txBody>
-      </p:sp>
-      <p:sp>
-        <p:nvSpPr>
-          <p:cNvPr id="3" name="Content Placeholder 2">
-            <a:extLst>
-              <a:ext uri="{FF2B5EF4-FFF2-40B4-BE49-F238E27FC236}">
-                <a16:creationId xmlns:a16="http://schemas.microsoft.com/office/drawing/2014/main" id="{7A5B4583-A045-E52D-60E3-883CF2117E5E}"/>
-              </a:ext>
-            </a:extLst>
-          </p:cNvPr>
-          <p:cNvSpPr>
-            <a:spLocks noGrp="1"/>
-          </p:cNvSpPr>
-          <p:nvPr>
-            <p:ph idx="1"/>
-          </p:nvPr>
-        </p:nvSpPr>
-        <p:spPr/>
-        <p:txBody>
-          <a:bodyPr/>
-          <a:lstStyle/>
-          <a:p>
-            <a:r>
-              <a:rPr lang="en-US" dirty="0"/>
-              <a:t>Most likely no. Most of the data will probably be created by me and inserted into a database.</a:t>
-            </a:r>
-          </a:p>
-          <a:p>
-            <a:r>
-              <a:rPr lang="en-US" dirty="0"/>
-              <a:t>My database will store dummy users and their flashcard decks, bulletin posts, and profile information.</a:t>
-            </a:r>
-          </a:p>
-        </p:txBody>
-      </p:sp>
-    </p:spTree>
-    <p:extLst>
-      <p:ext uri="{BB962C8B-B14F-4D97-AF65-F5344CB8AC3E}">
-        <p14:creationId xmlns:p14="http://schemas.microsoft.com/office/powerpoint/2010/main" val="3185255996"/>
-      </p:ext>
-    </p:extLst>
-  </p:cSld>
-  <p:clrMapOvr>
-    <a:masterClrMapping/>
-  </p:clrMapOvr>
-</p:sld>
-</file>
-
 <file path=ppt/slides/slide12.xml><?xml version="1.0" encoding="utf-8"?>
 <p:sld xmlns:a="http://schemas.openxmlformats.org/drawingml/2006/main" xmlns:r="http://schemas.openxmlformats.org/officeDocument/2006/relationships" xmlns:p="http://schemas.openxmlformats.org/presentationml/2006/main">
   <p:cSld>
@@ -3973,7 +3969,7 @@
           <p:cNvPr id="2" name="Title 1">
             <a:extLst>
               <a:ext uri="{FF2B5EF4-FFF2-40B4-BE49-F238E27FC236}">
-                <a16:creationId xmlns:a16="http://schemas.microsoft.com/office/drawing/2014/main" id="{DE1503D1-C320-6950-CE28-70CC52A74EE4}"/>
+                <a16:creationId xmlns:a16="http://schemas.microsoft.com/office/drawing/2014/main" id="{5B25892B-2D2F-A0FE-A7CD-632FCDFC1580}"/>
               </a:ext>
             </a:extLst>
           </p:cNvPr>
@@ -3991,7 +3987,7 @@
           <a:p>
             <a:r>
               <a:rPr lang="en-US" dirty="0"/>
-              <a:t>Use Case #1</a:t>
+              <a:t>Will I use any Datasets?</a:t>
             </a:r>
           </a:p>
         </p:txBody>
@@ -4001,7 +3997,7 @@
           <p:cNvPr id="3" name="Content Placeholder 2">
             <a:extLst>
               <a:ext uri="{FF2B5EF4-FFF2-40B4-BE49-F238E27FC236}">
-                <a16:creationId xmlns:a16="http://schemas.microsoft.com/office/drawing/2014/main" id="{D6ED56F3-6897-C646-F4D2-9B6C28C16DAC}"/>
+                <a16:creationId xmlns:a16="http://schemas.microsoft.com/office/drawing/2014/main" id="{7A5B4583-A045-E52D-60E3-883CF2117E5E}"/>
               </a:ext>
             </a:extLst>
           </p:cNvPr>
@@ -4019,7 +4015,13 @@
           <a:p>
             <a:r>
               <a:rPr lang="en-US" dirty="0"/>
-              <a:t>Scenario 1: A student will want to review flashcards for a history exam. The student will log in with their proper credentials and in the homepage click the plus button. A modal will pop up and take in definitions and terms inputted from the user in a form. Once submitted a deck object containing the terms will appear on the homepage. The student will click the matching game in the deck container to test themselves.</a:t>
+              <a:t>Most likely no. Most of the data will probably be created by me and inserted into a database.</a:t>
+            </a:r>
+          </a:p>
+          <a:p>
+            <a:r>
+              <a:rPr lang="en-US" dirty="0"/>
+              <a:t>My database will store dummy users and their flashcard decks, bulletin posts, and profile information.</a:t>
             </a:r>
           </a:p>
         </p:txBody>
@@ -4027,7 +4029,7 @@
     </p:spTree>
     <p:extLst>
       <p:ext uri="{BB962C8B-B14F-4D97-AF65-F5344CB8AC3E}">
-        <p14:creationId xmlns:p14="http://schemas.microsoft.com/office/powerpoint/2010/main" val="3043498632"/>
+        <p14:creationId xmlns:p14="http://schemas.microsoft.com/office/powerpoint/2010/main" val="3185255996"/>
       </p:ext>
     </p:extLst>
   </p:cSld>
@@ -4059,6 +4061,92 @@
           <p:cNvPr id="2" name="Title 1">
             <a:extLst>
               <a:ext uri="{FF2B5EF4-FFF2-40B4-BE49-F238E27FC236}">
+                <a16:creationId xmlns:a16="http://schemas.microsoft.com/office/drawing/2014/main" id="{DE1503D1-C320-6950-CE28-70CC52A74EE4}"/>
+              </a:ext>
+            </a:extLst>
+          </p:cNvPr>
+          <p:cNvSpPr>
+            <a:spLocks noGrp="1"/>
+          </p:cNvSpPr>
+          <p:nvPr>
+            <p:ph type="title"/>
+          </p:nvPr>
+        </p:nvSpPr>
+        <p:spPr/>
+        <p:txBody>
+          <a:bodyPr/>
+          <a:lstStyle/>
+          <a:p>
+            <a:r>
+              <a:rPr lang="en-US" dirty="0"/>
+              <a:t>Use Case #1</a:t>
+            </a:r>
+          </a:p>
+        </p:txBody>
+      </p:sp>
+      <p:sp>
+        <p:nvSpPr>
+          <p:cNvPr id="3" name="Content Placeholder 2">
+            <a:extLst>
+              <a:ext uri="{FF2B5EF4-FFF2-40B4-BE49-F238E27FC236}">
+                <a16:creationId xmlns:a16="http://schemas.microsoft.com/office/drawing/2014/main" id="{D6ED56F3-6897-C646-F4D2-9B6C28C16DAC}"/>
+              </a:ext>
+            </a:extLst>
+          </p:cNvPr>
+          <p:cNvSpPr>
+            <a:spLocks noGrp="1"/>
+          </p:cNvSpPr>
+          <p:nvPr>
+            <p:ph idx="1"/>
+          </p:nvPr>
+        </p:nvSpPr>
+        <p:spPr/>
+        <p:txBody>
+          <a:bodyPr/>
+          <a:lstStyle/>
+          <a:p>
+            <a:r>
+              <a:rPr lang="en-US" dirty="0"/>
+              <a:t>Scenario 1: A student will want to review flashcards for a history exam. The student will log in with their proper credentials and in the homepage click the plus button. A modal will pop up and take in definitions and terms inputted from the user in a form. Once submitted a deck object containing the terms will appear on the homepage. The student will click the matching game in the deck container to test themselves.</a:t>
+            </a:r>
+          </a:p>
+        </p:txBody>
+      </p:sp>
+    </p:spTree>
+    <p:extLst>
+      <p:ext uri="{BB962C8B-B14F-4D97-AF65-F5344CB8AC3E}">
+        <p14:creationId xmlns:p14="http://schemas.microsoft.com/office/powerpoint/2010/main" val="3043498632"/>
+      </p:ext>
+    </p:extLst>
+  </p:cSld>
+  <p:clrMapOvr>
+    <a:masterClrMapping/>
+  </p:clrMapOvr>
+</p:sld>
+</file>
+
+<file path=ppt/slides/slide14.xml><?xml version="1.0" encoding="utf-8"?>
+<p:sld xmlns:a="http://schemas.openxmlformats.org/drawingml/2006/main" xmlns:r="http://schemas.openxmlformats.org/officeDocument/2006/relationships" xmlns:p="http://schemas.openxmlformats.org/presentationml/2006/main">
+  <p:cSld>
+    <p:spTree>
+      <p:nvGrpSpPr>
+        <p:cNvPr id="1" name=""/>
+        <p:cNvGrpSpPr/>
+        <p:nvPr/>
+      </p:nvGrpSpPr>
+      <p:grpSpPr>
+        <a:xfrm>
+          <a:off x="0" y="0"/>
+          <a:ext cx="0" cy="0"/>
+          <a:chOff x="0" y="0"/>
+          <a:chExt cx="0" cy="0"/>
+        </a:xfrm>
+      </p:grpSpPr>
+      <p:sp>
+        <p:nvSpPr>
+          <p:cNvPr id="2" name="Title 1">
+            <a:extLst>
+              <a:ext uri="{FF2B5EF4-FFF2-40B4-BE49-F238E27FC236}">
                 <a16:creationId xmlns:a16="http://schemas.microsoft.com/office/drawing/2014/main" id="{F40BAA40-E70D-6D78-30EC-AF5C736577EC}"/>
               </a:ext>
             </a:extLst>
@@ -4123,7 +4211,7 @@
 </p:sld>
 </file>
 
-<file path=ppt/slides/slide14.xml><?xml version="1.0" encoding="utf-8"?>
+<file path=ppt/slides/slide15.xml><?xml version="1.0" encoding="utf-8"?>
 <p:sld xmlns:a="http://schemas.openxmlformats.org/drawingml/2006/main" xmlns:r="http://schemas.openxmlformats.org/officeDocument/2006/relationships" xmlns:p="http://schemas.openxmlformats.org/presentationml/2006/main">
   <p:cSld>
     <p:spTree>
@@ -4638,6 +4726,93 @@
           <p:cNvPr id="2" name="Title 1">
             <a:extLst>
               <a:ext uri="{FF2B5EF4-FFF2-40B4-BE49-F238E27FC236}">
+                <a16:creationId xmlns:a16="http://schemas.microsoft.com/office/drawing/2014/main" id="{24E60F5E-11BA-71A1-7BC4-2A76A02BC56F}"/>
+              </a:ext>
+            </a:extLst>
+          </p:cNvPr>
+          <p:cNvSpPr>
+            <a:spLocks noGrp="1"/>
+          </p:cNvSpPr>
+          <p:nvPr>
+            <p:ph type="title"/>
+          </p:nvPr>
+        </p:nvSpPr>
+        <p:spPr/>
+        <p:txBody>
+          <a:bodyPr/>
+          <a:lstStyle/>
+          <a:p>
+            <a:r>
+              <a:rPr lang="en-US" dirty="0"/>
+              <a:t>Log In Wireframe</a:t>
+            </a:r>
+          </a:p>
+        </p:txBody>
+      </p:sp>
+      <p:pic>
+        <p:nvPicPr>
+          <p:cNvPr id="5" name="Content Placeholder 4" descr="A login screen with a box and a log in box&#10;&#10;AI-generated content may be incorrect.">
+            <a:extLst>
+              <a:ext uri="{FF2B5EF4-FFF2-40B4-BE49-F238E27FC236}">
+                <a16:creationId xmlns:a16="http://schemas.microsoft.com/office/drawing/2014/main" id="{E98F32BD-F563-1BE0-492D-6DCA9FC73043}"/>
+              </a:ext>
+            </a:extLst>
+          </p:cNvPr>
+          <p:cNvPicPr>
+            <a:picLocks noGrp="1" noChangeAspect="1"/>
+          </p:cNvPicPr>
+          <p:nvPr>
+            <p:ph idx="1"/>
+          </p:nvPr>
+        </p:nvPicPr>
+        <p:blipFill>
+          <a:blip r:embed="rId2"/>
+          <a:stretch>
+            <a:fillRect/>
+          </a:stretch>
+        </p:blipFill>
+        <p:spPr>
+          <a:xfrm>
+            <a:off x="1460879" y="1825625"/>
+            <a:ext cx="9270241" cy="4351338"/>
+          </a:xfrm>
+        </p:spPr>
+      </p:pic>
+    </p:spTree>
+    <p:extLst>
+      <p:ext uri="{BB962C8B-B14F-4D97-AF65-F5344CB8AC3E}">
+        <p14:creationId xmlns:p14="http://schemas.microsoft.com/office/powerpoint/2010/main" val="3645080794"/>
+      </p:ext>
+    </p:extLst>
+  </p:cSld>
+  <p:clrMapOvr>
+    <a:masterClrMapping/>
+  </p:clrMapOvr>
+</p:sld>
+</file>
+
+<file path=ppt/slides/slide7.xml><?xml version="1.0" encoding="utf-8"?>
+<p:sld xmlns:a="http://schemas.openxmlformats.org/drawingml/2006/main" xmlns:r="http://schemas.openxmlformats.org/officeDocument/2006/relationships" xmlns:p="http://schemas.openxmlformats.org/presentationml/2006/main">
+  <p:cSld>
+    <p:spTree>
+      <p:nvGrpSpPr>
+        <p:cNvPr id="1" name=""/>
+        <p:cNvGrpSpPr/>
+        <p:nvPr/>
+      </p:nvGrpSpPr>
+      <p:grpSpPr>
+        <a:xfrm>
+          <a:off x="0" y="0"/>
+          <a:ext cx="0" cy="0"/>
+          <a:chOff x="0" y="0"/>
+          <a:chExt cx="0" cy="0"/>
+        </a:xfrm>
+      </p:grpSpPr>
+      <p:sp>
+        <p:nvSpPr>
+          <p:cNvPr id="2" name="Title 1">
+            <a:extLst>
+              <a:ext uri="{FF2B5EF4-FFF2-40B4-BE49-F238E27FC236}">
                 <a16:creationId xmlns:a16="http://schemas.microsoft.com/office/drawing/2014/main" id="{EB00B0C5-2145-44A8-1BC8-35B4911E5712}"/>
               </a:ext>
             </a:extLst>
@@ -4703,7 +4878,7 @@
 </p:sld>
 </file>
 
-<file path=ppt/slides/slide7.xml><?xml version="1.0" encoding="utf-8"?>
+<file path=ppt/slides/slide8.xml><?xml version="1.0" encoding="utf-8"?>
 <p:sld xmlns:a="http://schemas.openxmlformats.org/drawingml/2006/main" xmlns:r="http://schemas.openxmlformats.org/officeDocument/2006/relationships" xmlns:p="http://schemas.openxmlformats.org/presentationml/2006/main">
   <p:cSld>
     <p:spTree>
@@ -4790,7 +4965,7 @@
 </p:sld>
 </file>
 
-<file path=ppt/slides/slide8.xml><?xml version="1.0" encoding="utf-8"?>
+<file path=ppt/slides/slide9.xml><?xml version="1.0" encoding="utf-8"?>
 <p:sld xmlns:a="http://schemas.openxmlformats.org/drawingml/2006/main" xmlns:r="http://schemas.openxmlformats.org/officeDocument/2006/relationships" xmlns:p="http://schemas.openxmlformats.org/presentationml/2006/main">
   <p:cSld>
     <p:spTree>
@@ -4868,93 +5043,6 @@
     <p:extLst>
       <p:ext uri="{BB962C8B-B14F-4D97-AF65-F5344CB8AC3E}">
         <p14:creationId xmlns:p14="http://schemas.microsoft.com/office/powerpoint/2010/main" val="3661604359"/>
-      </p:ext>
-    </p:extLst>
-  </p:cSld>
-  <p:clrMapOvr>
-    <a:masterClrMapping/>
-  </p:clrMapOvr>
-</p:sld>
-</file>
-
-<file path=ppt/slides/slide9.xml><?xml version="1.0" encoding="utf-8"?>
-<p:sld xmlns:a="http://schemas.openxmlformats.org/drawingml/2006/main" xmlns:r="http://schemas.openxmlformats.org/officeDocument/2006/relationships" xmlns:p="http://schemas.openxmlformats.org/presentationml/2006/main">
-  <p:cSld>
-    <p:spTree>
-      <p:nvGrpSpPr>
-        <p:cNvPr id="1" name=""/>
-        <p:cNvGrpSpPr/>
-        <p:nvPr/>
-      </p:nvGrpSpPr>
-      <p:grpSpPr>
-        <a:xfrm>
-          <a:off x="0" y="0"/>
-          <a:ext cx="0" cy="0"/>
-          <a:chOff x="0" y="0"/>
-          <a:chExt cx="0" cy="0"/>
-        </a:xfrm>
-      </p:grpSpPr>
-      <p:sp>
-        <p:nvSpPr>
-          <p:cNvPr id="2" name="Title 1">
-            <a:extLst>
-              <a:ext uri="{FF2B5EF4-FFF2-40B4-BE49-F238E27FC236}">
-                <a16:creationId xmlns:a16="http://schemas.microsoft.com/office/drawing/2014/main" id="{34D8EF66-90EC-EE39-14CD-0D2110742D63}"/>
-              </a:ext>
-            </a:extLst>
-          </p:cNvPr>
-          <p:cNvSpPr>
-            <a:spLocks noGrp="1"/>
-          </p:cNvSpPr>
-          <p:nvPr>
-            <p:ph type="title"/>
-          </p:nvPr>
-        </p:nvSpPr>
-        <p:spPr/>
-        <p:txBody>
-          <a:bodyPr/>
-          <a:lstStyle/>
-          <a:p>
-            <a:r>
-              <a:rPr lang="en-US" dirty="0"/>
-              <a:t>About us Wireframe</a:t>
-            </a:r>
-          </a:p>
-        </p:txBody>
-      </p:sp>
-      <p:pic>
-        <p:nvPicPr>
-          <p:cNvPr id="5" name="Content Placeholder 4" descr="A screenshot of a computer&#10;&#10;AI-generated content may be incorrect.">
-            <a:extLst>
-              <a:ext uri="{FF2B5EF4-FFF2-40B4-BE49-F238E27FC236}">
-                <a16:creationId xmlns:a16="http://schemas.microsoft.com/office/drawing/2014/main" id="{16677C13-CA96-2340-AB69-E6811B6489AF}"/>
-              </a:ext>
-            </a:extLst>
-          </p:cNvPr>
-          <p:cNvPicPr>
-            <a:picLocks noGrp="1" noChangeAspect="1"/>
-          </p:cNvPicPr>
-          <p:nvPr>
-            <p:ph idx="1"/>
-          </p:nvPr>
-        </p:nvPicPr>
-        <p:blipFill>
-          <a:blip r:embed="rId2"/>
-          <a:stretch>
-            <a:fillRect/>
-          </a:stretch>
-        </p:blipFill>
-        <p:spPr>
-          <a:xfrm>
-            <a:off x="2340879" y="1825625"/>
-            <a:ext cx="7510242" cy="4351338"/>
-          </a:xfrm>
-        </p:spPr>
-      </p:pic>
-    </p:spTree>
-    <p:extLst>
-      <p:ext uri="{BB962C8B-B14F-4D97-AF65-F5344CB8AC3E}">
-        <p14:creationId xmlns:p14="http://schemas.microsoft.com/office/powerpoint/2010/main" val="3613504849"/>
       </p:ext>
     </p:extLst>
   </p:cSld>

</xml_diff>

<commit_message>
Updated Presenation Slides with new tentative schedule
</commit_message>
<xml_diff>
--- a/Design_Doc_MyStudies.pptx
+++ b/Design_Doc_MyStudies.pptx
@@ -16,10 +16,11 @@
     <p:sldId id="268" r:id="rId10"/>
     <p:sldId id="269" r:id="rId11"/>
     <p:sldId id="260" r:id="rId12"/>
-    <p:sldId id="261" r:id="rId13"/>
-    <p:sldId id="262" r:id="rId14"/>
-    <p:sldId id="265" r:id="rId15"/>
-    <p:sldId id="266" r:id="rId16"/>
+    <p:sldId id="271" r:id="rId13"/>
+    <p:sldId id="261" r:id="rId14"/>
+    <p:sldId id="262" r:id="rId15"/>
+    <p:sldId id="265" r:id="rId16"/>
+    <p:sldId id="266" r:id="rId17"/>
   </p:sldIdLst>
   <p:sldSz cx="12192000" cy="6858000"/>
   <p:notesSz cx="6858000" cy="9144000"/>
@@ -273,7 +274,7 @@
           <a:p>
             <a:fld id="{48A87A34-81AB-432B-8DAE-1953F412C126}" type="datetimeFigureOut">
               <a:rPr lang="en-US" smtClean="0"/>
-              <a:t>3/18/25</a:t>
+              <a:t>3/19/25</a:t>
             </a:fld>
             <a:endParaRPr lang="en-US" dirty="0"/>
           </a:p>
@@ -471,7 +472,7 @@
           <a:p>
             <a:fld id="{48A87A34-81AB-432B-8DAE-1953F412C126}" type="datetimeFigureOut">
               <a:rPr lang="en-US" smtClean="0"/>
-              <a:t>3/18/25</a:t>
+              <a:t>3/19/25</a:t>
             </a:fld>
             <a:endParaRPr lang="en-US" dirty="0"/>
           </a:p>
@@ -679,7 +680,7 @@
           <a:p>
             <a:fld id="{48A87A34-81AB-432B-8DAE-1953F412C126}" type="datetimeFigureOut">
               <a:rPr lang="en-US" smtClean="0"/>
-              <a:t>3/18/25</a:t>
+              <a:t>3/19/25</a:t>
             </a:fld>
             <a:endParaRPr lang="en-US" dirty="0"/>
           </a:p>
@@ -877,7 +878,7 @@
           <a:p>
             <a:fld id="{48A87A34-81AB-432B-8DAE-1953F412C126}" type="datetimeFigureOut">
               <a:rPr lang="en-US" smtClean="0"/>
-              <a:t>3/18/25</a:t>
+              <a:t>3/19/25</a:t>
             </a:fld>
             <a:endParaRPr lang="en-US" dirty="0"/>
           </a:p>
@@ -1152,7 +1153,7 @@
           <a:p>
             <a:fld id="{48A87A34-81AB-432B-8DAE-1953F412C126}" type="datetimeFigureOut">
               <a:rPr lang="en-US" smtClean="0"/>
-              <a:t>3/18/25</a:t>
+              <a:t>3/19/25</a:t>
             </a:fld>
             <a:endParaRPr lang="en-US" dirty="0"/>
           </a:p>
@@ -1417,7 +1418,7 @@
           <a:p>
             <a:fld id="{48A87A34-81AB-432B-8DAE-1953F412C126}" type="datetimeFigureOut">
               <a:rPr lang="en-US" smtClean="0"/>
-              <a:t>3/18/25</a:t>
+              <a:t>3/19/25</a:t>
             </a:fld>
             <a:endParaRPr lang="en-US" dirty="0"/>
           </a:p>
@@ -1830,7 +1831,7 @@
             <a:fld id="{48A87A34-81AB-432B-8DAE-1953F412C126}" type="datetimeFigureOut">
               <a:rPr lang="en-US" smtClean="0"/>
               <a:pPr/>
-              <a:t>3/18/25</a:t>
+              <a:t>3/19/25</a:t>
             </a:fld>
             <a:endParaRPr lang="en-US" dirty="0"/>
           </a:p>
@@ -1972,7 +1973,7 @@
           <a:p>
             <a:fld id="{48A87A34-81AB-432B-8DAE-1953F412C126}" type="datetimeFigureOut">
               <a:rPr lang="en-US" smtClean="0"/>
-              <a:t>3/18/25</a:t>
+              <a:t>3/19/25</a:t>
             </a:fld>
             <a:endParaRPr lang="en-US" dirty="0"/>
           </a:p>
@@ -2085,7 +2086,7 @@
           <a:p>
             <a:fld id="{48A87A34-81AB-432B-8DAE-1953F412C126}" type="datetimeFigureOut">
               <a:rPr lang="en-US" smtClean="0"/>
-              <a:t>3/18/25</a:t>
+              <a:t>3/19/25</a:t>
             </a:fld>
             <a:endParaRPr lang="en-US" dirty="0"/>
           </a:p>
@@ -2396,7 +2397,7 @@
           <a:p>
             <a:fld id="{48A87A34-81AB-432B-8DAE-1953F412C126}" type="datetimeFigureOut">
               <a:rPr lang="en-US" smtClean="0"/>
-              <a:t>3/18/25</a:t>
+              <a:t>3/19/25</a:t>
             </a:fld>
             <a:endParaRPr lang="en-US" dirty="0"/>
           </a:p>
@@ -2685,7 +2686,7 @@
             <a:fld id="{48A87A34-81AB-432B-8DAE-1953F412C126}" type="datetimeFigureOut">
               <a:rPr lang="en-US" smtClean="0"/>
               <a:pPr/>
-              <a:t>3/18/25</a:t>
+              <a:t>3/19/25</a:t>
             </a:fld>
             <a:endParaRPr lang="en-US" dirty="0"/>
           </a:p>
@@ -2927,7 +2928,7 @@
             <a:fld id="{48A87A34-81AB-432B-8DAE-1953F412C126}" type="datetimeFigureOut">
               <a:rPr lang="en-US" smtClean="0"/>
               <a:pPr/>
-              <a:t>3/18/25</a:t>
+              <a:t>3/19/25</a:t>
             </a:fld>
             <a:endParaRPr lang="en-US" dirty="0"/>
           </a:p>
@@ -3969,7 +3970,7 @@
           <p:cNvPr id="2" name="Title 1">
             <a:extLst>
               <a:ext uri="{FF2B5EF4-FFF2-40B4-BE49-F238E27FC236}">
-                <a16:creationId xmlns:a16="http://schemas.microsoft.com/office/drawing/2014/main" id="{5B25892B-2D2F-A0FE-A7CD-632FCDFC1580}"/>
+                <a16:creationId xmlns:a16="http://schemas.microsoft.com/office/drawing/2014/main" id="{E44BDA06-200D-2E9C-015A-3F27B6193341}"/>
               </a:ext>
             </a:extLst>
           </p:cNvPr>
@@ -3987,49 +3988,383 @@
           <a:p>
             <a:r>
               <a:rPr lang="en-US" dirty="0"/>
-              <a:t>Will I use any Datasets?</a:t>
-            </a:r>
-          </a:p>
-        </p:txBody>
-      </p:sp>
-      <p:sp>
-        <p:nvSpPr>
-          <p:cNvPr id="3" name="Content Placeholder 2">
-            <a:extLst>
-              <a:ext uri="{FF2B5EF4-FFF2-40B4-BE49-F238E27FC236}">
-                <a16:creationId xmlns:a16="http://schemas.microsoft.com/office/drawing/2014/main" id="{7A5B4583-A045-E52D-60E3-883CF2117E5E}"/>
-              </a:ext>
-            </a:extLst>
-          </p:cNvPr>
-          <p:cNvSpPr>
-            <a:spLocks noGrp="1"/>
-          </p:cNvSpPr>
+              <a:t>Updated Tentative Schedule</a:t>
+            </a:r>
+          </a:p>
+        </p:txBody>
+      </p:sp>
+      <p:graphicFrame>
+        <p:nvGraphicFramePr>
+          <p:cNvPr id="4" name="Content Placeholder 3">
+            <a:extLst>
+              <a:ext uri="{FF2B5EF4-FFF2-40B4-BE49-F238E27FC236}">
+                <a16:creationId xmlns:a16="http://schemas.microsoft.com/office/drawing/2014/main" id="{75559585-B2C7-DB8A-D3B0-E3AC0A3EC5C7}"/>
+              </a:ext>
+            </a:extLst>
+          </p:cNvPr>
+          <p:cNvGraphicFramePr>
+            <a:graphicFrameLocks noGrp="1"/>
+          </p:cNvGraphicFramePr>
           <p:nvPr>
             <p:ph idx="1"/>
-          </p:nvPr>
-        </p:nvSpPr>
-        <p:spPr/>
-        <p:txBody>
-          <a:bodyPr/>
-          <a:lstStyle/>
-          <a:p>
-            <a:r>
-              <a:rPr lang="en-US" dirty="0"/>
-              <a:t>Most likely no. Most of the data will probably be created by me and inserted into a database.</a:t>
-            </a:r>
-          </a:p>
-          <a:p>
-            <a:r>
-              <a:rPr lang="en-US" dirty="0"/>
-              <a:t>My database will store dummy users and their flashcard decks, bulletin posts, and profile information.</a:t>
-            </a:r>
-          </a:p>
-        </p:txBody>
-      </p:sp>
+            <p:extLst>
+              <p:ext uri="{D42A27DB-BD31-4B8C-83A1-F6EECF244321}">
+                <p14:modId xmlns:p14="http://schemas.microsoft.com/office/powerpoint/2010/main" val="2216783746"/>
+              </p:ext>
+            </p:extLst>
+          </p:nvPr>
+        </p:nvGraphicFramePr>
+        <p:xfrm>
+          <a:off x="838200" y="1825625"/>
+          <a:ext cx="10515600" cy="3337560"/>
+        </p:xfrm>
+        <a:graphic>
+          <a:graphicData uri="http://schemas.openxmlformats.org/drawingml/2006/table">
+            <a:tbl>
+              <a:tblPr firstRow="1" bandRow="1">
+                <a:tableStyleId>{5C22544A-7EE6-4342-B048-85BDC9FD1C3A}</a:tableStyleId>
+              </a:tblPr>
+              <a:tblGrid>
+                <a:gridCol w="5257800">
+                  <a:extLst>
+                    <a:ext uri="{9D8B030D-6E8A-4147-A177-3AD203B41FA5}">
+                      <a16:colId xmlns:a16="http://schemas.microsoft.com/office/drawing/2014/main" val="2972870014"/>
+                    </a:ext>
+                  </a:extLst>
+                </a:gridCol>
+                <a:gridCol w="5257800">
+                  <a:extLst>
+                    <a:ext uri="{9D8B030D-6E8A-4147-A177-3AD203B41FA5}">
+                      <a16:colId xmlns:a16="http://schemas.microsoft.com/office/drawing/2014/main" val="3308739997"/>
+                    </a:ext>
+                  </a:extLst>
+                </a:gridCol>
+              </a:tblGrid>
+              <a:tr h="370840">
+                <a:tc>
+                  <a:txBody>
+                    <a:bodyPr/>
+                    <a:lstStyle/>
+                    <a:p>
+                      <a:pPr algn="ctr"/>
+                      <a:r>
+                        <a:rPr lang="en-US" dirty="0"/>
+                        <a:t>Tasks</a:t>
+                      </a:r>
+                    </a:p>
+                  </a:txBody>
+                  <a:tcPr/>
+                </a:tc>
+                <a:tc>
+                  <a:txBody>
+                    <a:bodyPr/>
+                    <a:lstStyle/>
+                    <a:p>
+                      <a:pPr algn="ctr"/>
+                      <a:r>
+                        <a:rPr lang="en-US" dirty="0"/>
+                        <a:t>Timeframe</a:t>
+                      </a:r>
+                    </a:p>
+                  </a:txBody>
+                  <a:tcPr/>
+                </a:tc>
+                <a:extLst>
+                  <a:ext uri="{0D108BD9-81ED-4DB2-BD59-A6C34878D82A}">
+                    <a16:rowId xmlns:a16="http://schemas.microsoft.com/office/drawing/2014/main" val="3528264135"/>
+                  </a:ext>
+                </a:extLst>
+              </a:tr>
+              <a:tr h="370840">
+                <a:tc>
+                  <a:txBody>
+                    <a:bodyPr/>
+                    <a:lstStyle/>
+                    <a:p>
+                      <a:pPr algn="l"/>
+                      <a:r>
+                        <a:rPr lang="en-US" dirty="0"/>
+                        <a:t>Live Presentation</a:t>
+                      </a:r>
+                    </a:p>
+                  </a:txBody>
+                  <a:tcPr/>
+                </a:tc>
+                <a:tc>
+                  <a:txBody>
+                    <a:bodyPr/>
+                    <a:lstStyle/>
+                    <a:p>
+                      <a:pPr algn="l"/>
+                      <a:r>
+                        <a:rPr lang="en-US" dirty="0"/>
+                        <a:t> Week 8</a:t>
+                      </a:r>
+                    </a:p>
+                  </a:txBody>
+                  <a:tcPr/>
+                </a:tc>
+                <a:extLst>
+                  <a:ext uri="{0D108BD9-81ED-4DB2-BD59-A6C34878D82A}">
+                    <a16:rowId xmlns:a16="http://schemas.microsoft.com/office/drawing/2014/main" val="3288677042"/>
+                  </a:ext>
+                </a:extLst>
+              </a:tr>
+              <a:tr h="370840">
+                <a:tc>
+                  <a:txBody>
+                    <a:bodyPr/>
+                    <a:lstStyle/>
+                    <a:p>
+                      <a:r>
+                        <a:rPr lang="en-US" dirty="0"/>
+                        <a:t>Bulletin and Profile Functionality</a:t>
+                      </a:r>
+                    </a:p>
+                  </a:txBody>
+                  <a:tcPr/>
+                </a:tc>
+                <a:tc>
+                  <a:txBody>
+                    <a:bodyPr/>
+                    <a:lstStyle/>
+                    <a:p>
+                      <a:r>
+                        <a:rPr lang="en-US" dirty="0"/>
+                        <a:t> Week 8</a:t>
+                      </a:r>
+                    </a:p>
+                  </a:txBody>
+                  <a:tcPr/>
+                </a:tc>
+                <a:extLst>
+                  <a:ext uri="{0D108BD9-81ED-4DB2-BD59-A6C34878D82A}">
+                    <a16:rowId xmlns:a16="http://schemas.microsoft.com/office/drawing/2014/main" val="1593306539"/>
+                  </a:ext>
+                </a:extLst>
+              </a:tr>
+              <a:tr h="370840">
+                <a:tc>
+                  <a:txBody>
+                    <a:bodyPr/>
+                    <a:lstStyle/>
+                    <a:p>
+                      <a:r>
+                        <a:rPr lang="en-US" dirty="0" err="1"/>
+                        <a:t>Flashdeck</a:t>
+                      </a:r>
+                      <a:r>
+                        <a:rPr lang="en-US" dirty="0"/>
+                        <a:t> Implementation and Features</a:t>
+                      </a:r>
+                    </a:p>
+                  </a:txBody>
+                  <a:tcPr/>
+                </a:tc>
+                <a:tc>
+                  <a:txBody>
+                    <a:bodyPr/>
+                    <a:lstStyle/>
+                    <a:p>
+                      <a:r>
+                        <a:rPr lang="en-US" dirty="0"/>
+                        <a:t> Week 8-10</a:t>
+                      </a:r>
+                    </a:p>
+                  </a:txBody>
+                  <a:tcPr/>
+                </a:tc>
+                <a:extLst>
+                  <a:ext uri="{0D108BD9-81ED-4DB2-BD59-A6C34878D82A}">
+                    <a16:rowId xmlns:a16="http://schemas.microsoft.com/office/drawing/2014/main" val="1474767323"/>
+                  </a:ext>
+                </a:extLst>
+              </a:tr>
+              <a:tr h="370840">
+                <a:tc>
+                  <a:txBody>
+                    <a:bodyPr/>
+                    <a:lstStyle/>
+                    <a:p>
+                      <a:r>
+                        <a:rPr lang="en-US" dirty="0" err="1"/>
+                        <a:t>NodeJs</a:t>
+                      </a:r>
+                      <a:r>
+                        <a:rPr lang="en-US" dirty="0"/>
+                        <a:t> and Backend Research</a:t>
+                      </a:r>
+                    </a:p>
+                  </a:txBody>
+                  <a:tcPr/>
+                </a:tc>
+                <a:tc>
+                  <a:txBody>
+                    <a:bodyPr/>
+                    <a:lstStyle/>
+                    <a:p>
+                      <a:r>
+                        <a:rPr lang="en-US" dirty="0"/>
+                        <a:t>Week 8-10</a:t>
+                      </a:r>
+                    </a:p>
+                  </a:txBody>
+                  <a:tcPr/>
+                </a:tc>
+                <a:extLst>
+                  <a:ext uri="{0D108BD9-81ED-4DB2-BD59-A6C34878D82A}">
+                    <a16:rowId xmlns:a16="http://schemas.microsoft.com/office/drawing/2014/main" val="201237676"/>
+                  </a:ext>
+                </a:extLst>
+              </a:tr>
+              <a:tr h="370840">
+                <a:tc>
+                  <a:txBody>
+                    <a:bodyPr/>
+                    <a:lstStyle/>
+                    <a:p>
+                      <a:r>
+                        <a:rPr lang="en-US" dirty="0"/>
+                        <a:t>Presentation Slides</a:t>
+                      </a:r>
+                    </a:p>
+                  </a:txBody>
+                  <a:tcPr/>
+                </a:tc>
+                <a:tc>
+                  <a:txBody>
+                    <a:bodyPr/>
+                    <a:lstStyle/>
+                    <a:p>
+                      <a:r>
+                        <a:rPr lang="en-US" dirty="0"/>
+                        <a:t>Week 10</a:t>
+                      </a:r>
+                    </a:p>
+                  </a:txBody>
+                  <a:tcPr/>
+                </a:tc>
+                <a:extLst>
+                  <a:ext uri="{0D108BD9-81ED-4DB2-BD59-A6C34878D82A}">
+                    <a16:rowId xmlns:a16="http://schemas.microsoft.com/office/drawing/2014/main" val="1619871602"/>
+                  </a:ext>
+                </a:extLst>
+              </a:tr>
+              <a:tr h="370840">
+                <a:tc>
+                  <a:txBody>
+                    <a:bodyPr/>
+                    <a:lstStyle/>
+                    <a:p>
+                      <a:r>
+                        <a:rPr lang="en-US" dirty="0"/>
+                        <a:t>Demo 2</a:t>
+                      </a:r>
+                    </a:p>
+                  </a:txBody>
+                  <a:tcPr/>
+                </a:tc>
+                <a:tc>
+                  <a:txBody>
+                    <a:bodyPr/>
+                    <a:lstStyle/>
+                    <a:p>
+                      <a:r>
+                        <a:rPr lang="en-US" dirty="0"/>
+                        <a:t>Week 11</a:t>
+                      </a:r>
+                    </a:p>
+                  </a:txBody>
+                  <a:tcPr/>
+                </a:tc>
+                <a:extLst>
+                  <a:ext uri="{0D108BD9-81ED-4DB2-BD59-A6C34878D82A}">
+                    <a16:rowId xmlns:a16="http://schemas.microsoft.com/office/drawing/2014/main" val="1739792623"/>
+                  </a:ext>
+                </a:extLst>
+              </a:tr>
+              <a:tr h="370840">
+                <a:tc>
+                  <a:txBody>
+                    <a:bodyPr/>
+                    <a:lstStyle/>
+                    <a:p>
+                      <a:r>
+                        <a:rPr lang="en-US" dirty="0"/>
+                        <a:t>Backend and Database Implementation</a:t>
+                      </a:r>
+                    </a:p>
+                  </a:txBody>
+                  <a:tcPr/>
+                </a:tc>
+                <a:tc>
+                  <a:txBody>
+                    <a:bodyPr/>
+                    <a:lstStyle/>
+                    <a:p>
+                      <a:r>
+                        <a:rPr lang="en-US" dirty="0"/>
+                        <a:t>Weeks 11-14</a:t>
+                      </a:r>
+                    </a:p>
+                  </a:txBody>
+                  <a:tcPr/>
+                </a:tc>
+                <a:extLst>
+                  <a:ext uri="{0D108BD9-81ED-4DB2-BD59-A6C34878D82A}">
+                    <a16:rowId xmlns:a16="http://schemas.microsoft.com/office/drawing/2014/main" val="2342312753"/>
+                  </a:ext>
+                </a:extLst>
+              </a:tr>
+              <a:tr h="370840">
+                <a:tc>
+                  <a:txBody>
+                    <a:bodyPr/>
+                    <a:lstStyle/>
+                    <a:p>
+                      <a:r>
+                        <a:rPr lang="en-US" dirty="0"/>
+                        <a:t>Final Draft </a:t>
+                      </a:r>
+                      <a:r>
+                        <a:rPr lang="en-US" dirty="0" err="1"/>
+                        <a:t>Presenation</a:t>
+                      </a:r>
+                      <a:r>
+                        <a:rPr lang="en-US" dirty="0"/>
+                        <a:t> Slides</a:t>
+                      </a:r>
+                    </a:p>
+                  </a:txBody>
+                  <a:tcPr/>
+                </a:tc>
+                <a:tc>
+                  <a:txBody>
+                    <a:bodyPr/>
+                    <a:lstStyle/>
+                    <a:p>
+                      <a:r>
+                        <a:rPr lang="en-US" dirty="0"/>
+                        <a:t>Weeks 13-15</a:t>
+                      </a:r>
+                    </a:p>
+                  </a:txBody>
+                  <a:tcPr/>
+                </a:tc>
+                <a:extLst>
+                  <a:ext uri="{0D108BD9-81ED-4DB2-BD59-A6C34878D82A}">
+                    <a16:rowId xmlns:a16="http://schemas.microsoft.com/office/drawing/2014/main" val="2325874511"/>
+                  </a:ext>
+                </a:extLst>
+              </a:tr>
+            </a:tbl>
+          </a:graphicData>
+        </a:graphic>
+      </p:graphicFrame>
     </p:spTree>
     <p:extLst>
       <p:ext uri="{BB962C8B-B14F-4D97-AF65-F5344CB8AC3E}">
-        <p14:creationId xmlns:p14="http://schemas.microsoft.com/office/powerpoint/2010/main" val="3185255996"/>
+        <p14:creationId xmlns:p14="http://schemas.microsoft.com/office/powerpoint/2010/main" val="3752165945"/>
       </p:ext>
     </p:extLst>
   </p:cSld>
@@ -4061,7 +4396,7 @@
           <p:cNvPr id="2" name="Title 1">
             <a:extLst>
               <a:ext uri="{FF2B5EF4-FFF2-40B4-BE49-F238E27FC236}">
-                <a16:creationId xmlns:a16="http://schemas.microsoft.com/office/drawing/2014/main" id="{DE1503D1-C320-6950-CE28-70CC52A74EE4}"/>
+                <a16:creationId xmlns:a16="http://schemas.microsoft.com/office/drawing/2014/main" id="{5B25892B-2D2F-A0FE-A7CD-632FCDFC1580}"/>
               </a:ext>
             </a:extLst>
           </p:cNvPr>
@@ -4079,7 +4414,7 @@
           <a:p>
             <a:r>
               <a:rPr lang="en-US" dirty="0"/>
-              <a:t>Use Case #1</a:t>
+              <a:t>Will I use any Datasets?</a:t>
             </a:r>
           </a:p>
         </p:txBody>
@@ -4089,7 +4424,7 @@
           <p:cNvPr id="3" name="Content Placeholder 2">
             <a:extLst>
               <a:ext uri="{FF2B5EF4-FFF2-40B4-BE49-F238E27FC236}">
-                <a16:creationId xmlns:a16="http://schemas.microsoft.com/office/drawing/2014/main" id="{D6ED56F3-6897-C646-F4D2-9B6C28C16DAC}"/>
+                <a16:creationId xmlns:a16="http://schemas.microsoft.com/office/drawing/2014/main" id="{7A5B4583-A045-E52D-60E3-883CF2117E5E}"/>
               </a:ext>
             </a:extLst>
           </p:cNvPr>
@@ -4107,7 +4442,13 @@
           <a:p>
             <a:r>
               <a:rPr lang="en-US" dirty="0"/>
-              <a:t>Scenario 1: A student will want to review flashcards for a history exam. The student will log in with their proper credentials and in the homepage click the plus button. A modal will pop up and take in definitions and terms inputted from the user in a form. Once submitted a deck object containing the terms will appear on the homepage. The student will click the matching game in the deck container to test themselves.</a:t>
+              <a:t>Most likely no. Most of the data will probably be created by me and inserted into a database.</a:t>
+            </a:r>
+          </a:p>
+          <a:p>
+            <a:r>
+              <a:rPr lang="en-US" dirty="0"/>
+              <a:t>My database will store dummy users and their flashcard decks, bulletin posts, and profile information.</a:t>
             </a:r>
           </a:p>
         </p:txBody>
@@ -4115,7 +4456,7 @@
     </p:spTree>
     <p:extLst>
       <p:ext uri="{BB962C8B-B14F-4D97-AF65-F5344CB8AC3E}">
-        <p14:creationId xmlns:p14="http://schemas.microsoft.com/office/powerpoint/2010/main" val="3043498632"/>
+        <p14:creationId xmlns:p14="http://schemas.microsoft.com/office/powerpoint/2010/main" val="3185255996"/>
       </p:ext>
     </p:extLst>
   </p:cSld>
@@ -4147,6 +4488,92 @@
           <p:cNvPr id="2" name="Title 1">
             <a:extLst>
               <a:ext uri="{FF2B5EF4-FFF2-40B4-BE49-F238E27FC236}">
+                <a16:creationId xmlns:a16="http://schemas.microsoft.com/office/drawing/2014/main" id="{DE1503D1-C320-6950-CE28-70CC52A74EE4}"/>
+              </a:ext>
+            </a:extLst>
+          </p:cNvPr>
+          <p:cNvSpPr>
+            <a:spLocks noGrp="1"/>
+          </p:cNvSpPr>
+          <p:nvPr>
+            <p:ph type="title"/>
+          </p:nvPr>
+        </p:nvSpPr>
+        <p:spPr/>
+        <p:txBody>
+          <a:bodyPr/>
+          <a:lstStyle/>
+          <a:p>
+            <a:r>
+              <a:rPr lang="en-US" dirty="0"/>
+              <a:t>Use Case #1</a:t>
+            </a:r>
+          </a:p>
+        </p:txBody>
+      </p:sp>
+      <p:sp>
+        <p:nvSpPr>
+          <p:cNvPr id="3" name="Content Placeholder 2">
+            <a:extLst>
+              <a:ext uri="{FF2B5EF4-FFF2-40B4-BE49-F238E27FC236}">
+                <a16:creationId xmlns:a16="http://schemas.microsoft.com/office/drawing/2014/main" id="{D6ED56F3-6897-C646-F4D2-9B6C28C16DAC}"/>
+              </a:ext>
+            </a:extLst>
+          </p:cNvPr>
+          <p:cNvSpPr>
+            <a:spLocks noGrp="1"/>
+          </p:cNvSpPr>
+          <p:nvPr>
+            <p:ph idx="1"/>
+          </p:nvPr>
+        </p:nvSpPr>
+        <p:spPr/>
+        <p:txBody>
+          <a:bodyPr/>
+          <a:lstStyle/>
+          <a:p>
+            <a:r>
+              <a:rPr lang="en-US" dirty="0"/>
+              <a:t>Scenario 1: A student will want to review flashcards for a history exam. The student will log in with their proper credentials and in the homepage click the plus button. A modal will pop up and take in definitions and terms inputted from the user in a form. Once submitted a deck object containing the terms will appear on the homepage. The student will click the matching game in the deck container to test themselves.</a:t>
+            </a:r>
+          </a:p>
+        </p:txBody>
+      </p:sp>
+    </p:spTree>
+    <p:extLst>
+      <p:ext uri="{BB962C8B-B14F-4D97-AF65-F5344CB8AC3E}">
+        <p14:creationId xmlns:p14="http://schemas.microsoft.com/office/powerpoint/2010/main" val="3043498632"/>
+      </p:ext>
+    </p:extLst>
+  </p:cSld>
+  <p:clrMapOvr>
+    <a:masterClrMapping/>
+  </p:clrMapOvr>
+</p:sld>
+</file>
+
+<file path=ppt/slides/slide15.xml><?xml version="1.0" encoding="utf-8"?>
+<p:sld xmlns:a="http://schemas.openxmlformats.org/drawingml/2006/main" xmlns:r="http://schemas.openxmlformats.org/officeDocument/2006/relationships" xmlns:p="http://schemas.openxmlformats.org/presentationml/2006/main">
+  <p:cSld>
+    <p:spTree>
+      <p:nvGrpSpPr>
+        <p:cNvPr id="1" name=""/>
+        <p:cNvGrpSpPr/>
+        <p:nvPr/>
+      </p:nvGrpSpPr>
+      <p:grpSpPr>
+        <a:xfrm>
+          <a:off x="0" y="0"/>
+          <a:ext cx="0" cy="0"/>
+          <a:chOff x="0" y="0"/>
+          <a:chExt cx="0" cy="0"/>
+        </a:xfrm>
+      </p:grpSpPr>
+      <p:sp>
+        <p:nvSpPr>
+          <p:cNvPr id="2" name="Title 1">
+            <a:extLst>
+              <a:ext uri="{FF2B5EF4-FFF2-40B4-BE49-F238E27FC236}">
                 <a16:creationId xmlns:a16="http://schemas.microsoft.com/office/drawing/2014/main" id="{F40BAA40-E70D-6D78-30EC-AF5C736577EC}"/>
               </a:ext>
             </a:extLst>
@@ -4211,7 +4638,7 @@
 </p:sld>
 </file>
 
-<file path=ppt/slides/slide15.xml><?xml version="1.0" encoding="utf-8"?>
+<file path=ppt/slides/slide16.xml><?xml version="1.0" encoding="utf-8"?>
 <p:sld xmlns:a="http://schemas.openxmlformats.org/drawingml/2006/main" xmlns:r="http://schemas.openxmlformats.org/officeDocument/2006/relationships" xmlns:p="http://schemas.openxmlformats.org/presentationml/2006/main">
   <p:cSld>
     <p:spTree>

</xml_diff>